<commit_message>
Remove unnecessary fence warm-up (actually don't use -1 as initial value (use 0 instead) and everything will be OK)
</commit_message>
<xml_diff>
--- a/Doc/RU/13.DirectX 12 Инициализация.pptx
+++ b/Doc/RU/13.DirectX 12 Инициализация.pptx
@@ -231,7 +231,7 @@
           <a:p>
             <a:fld id="{7806E7DD-7C54-4C01-A2A4-6BA49D7CCE86}" type="datetimeFigureOut">
               <a:rPr lang="en-US" smtClean="0"/>
-              <a:t>5/11/2022</a:t>
+              <a:t>1/10/2024</a:t>
             </a:fld>
             <a:endParaRPr lang="en-US"/>
           </a:p>
@@ -2024,7 +2024,7 @@
           <a:p>
             <a:fld id="{846CE7D5-CF57-46EF-B807-FDD0502418D4}" type="datetimeFigureOut">
               <a:rPr lang="en-US" smtClean="0"/>
-              <a:t>5/11/2022</a:t>
+              <a:t>1/10/2024</a:t>
             </a:fld>
             <a:endParaRPr lang="en-US"/>
           </a:p>
@@ -2195,7 +2195,7 @@
           <a:p>
             <a:fld id="{846CE7D5-CF57-46EF-B807-FDD0502418D4}" type="datetimeFigureOut">
               <a:rPr lang="en-US" smtClean="0"/>
-              <a:t>5/11/2022</a:t>
+              <a:t>1/10/2024</a:t>
             </a:fld>
             <a:endParaRPr lang="en-US"/>
           </a:p>
@@ -2376,7 +2376,7 @@
           <a:p>
             <a:fld id="{846CE7D5-CF57-46EF-B807-FDD0502418D4}" type="datetimeFigureOut">
               <a:rPr lang="en-US" smtClean="0"/>
-              <a:t>5/11/2022</a:t>
+              <a:t>1/10/2024</a:t>
             </a:fld>
             <a:endParaRPr lang="en-US"/>
           </a:p>
@@ -2547,7 +2547,7 @@
           <a:p>
             <a:fld id="{846CE7D5-CF57-46EF-B807-FDD0502418D4}" type="datetimeFigureOut">
               <a:rPr lang="en-US" smtClean="0"/>
-              <a:t>5/11/2022</a:t>
+              <a:t>1/10/2024</a:t>
             </a:fld>
             <a:endParaRPr lang="en-US"/>
           </a:p>
@@ -2794,7 +2794,7 @@
           <a:p>
             <a:fld id="{846CE7D5-CF57-46EF-B807-FDD0502418D4}" type="datetimeFigureOut">
               <a:rPr lang="en-US" smtClean="0"/>
-              <a:t>5/11/2022</a:t>
+              <a:t>1/10/2024</a:t>
             </a:fld>
             <a:endParaRPr lang="en-US"/>
           </a:p>
@@ -3027,7 +3027,7 @@
           <a:p>
             <a:fld id="{846CE7D5-CF57-46EF-B807-FDD0502418D4}" type="datetimeFigureOut">
               <a:rPr lang="en-US" smtClean="0"/>
-              <a:t>5/11/2022</a:t>
+              <a:t>1/10/2024</a:t>
             </a:fld>
             <a:endParaRPr lang="en-US"/>
           </a:p>
@@ -3395,7 +3395,7 @@
           <a:p>
             <a:fld id="{846CE7D5-CF57-46EF-B807-FDD0502418D4}" type="datetimeFigureOut">
               <a:rPr lang="en-US" smtClean="0"/>
-              <a:t>5/11/2022</a:t>
+              <a:t>1/10/2024</a:t>
             </a:fld>
             <a:endParaRPr lang="en-US"/>
           </a:p>
@@ -3514,7 +3514,7 @@
           <a:p>
             <a:fld id="{846CE7D5-CF57-46EF-B807-FDD0502418D4}" type="datetimeFigureOut">
               <a:rPr lang="en-US" smtClean="0"/>
-              <a:t>5/11/2022</a:t>
+              <a:t>1/10/2024</a:t>
             </a:fld>
             <a:endParaRPr lang="en-US"/>
           </a:p>
@@ -3610,7 +3610,7 @@
           <a:p>
             <a:fld id="{846CE7D5-CF57-46EF-B807-FDD0502418D4}" type="datetimeFigureOut">
               <a:rPr lang="en-US" smtClean="0"/>
-              <a:t>5/11/2022</a:t>
+              <a:t>1/10/2024</a:t>
             </a:fld>
             <a:endParaRPr lang="en-US"/>
           </a:p>
@@ -3888,7 +3888,7 @@
           <a:p>
             <a:fld id="{846CE7D5-CF57-46EF-B807-FDD0502418D4}" type="datetimeFigureOut">
               <a:rPr lang="en-US" smtClean="0"/>
-              <a:t>5/11/2022</a:t>
+              <a:t>1/10/2024</a:t>
             </a:fld>
             <a:endParaRPr lang="en-US"/>
           </a:p>
@@ -4146,7 +4146,7 @@
           <a:p>
             <a:fld id="{846CE7D5-CF57-46EF-B807-FDD0502418D4}" type="datetimeFigureOut">
               <a:rPr lang="en-US" smtClean="0"/>
-              <a:t>5/11/2022</a:t>
+              <a:t>1/10/2024</a:t>
             </a:fld>
             <a:endParaRPr lang="en-US"/>
           </a:p>
@@ -4360,7 +4360,7 @@
           <a:p>
             <a:fld id="{846CE7D5-CF57-46EF-B807-FDD0502418D4}" type="datetimeFigureOut">
               <a:rPr lang="en-US" smtClean="0"/>
-              <a:t>5/11/2022</a:t>
+              <a:t>1/10/2024</a:t>
             </a:fld>
             <a:endParaRPr lang="en-US"/>
           </a:p>
@@ -12222,7 +12222,19 @@
               <a:rPr lang="ru-RU" sz="2000" dirty="0">
                 <a:cs typeface="Calibri"/>
               </a:rPr>
-              <a:t>Когда выполнение задач в данной	 очереди доходит до указанного места, текущее значение </a:t>
+              <a:t>Когда выполнение задач в данной</a:t>
+            </a:r>
+            <a:r>
+              <a:rPr lang="en-US" sz="2000" dirty="0">
+                <a:cs typeface="Calibri"/>
+              </a:rPr>
+              <a:t> </a:t>
+            </a:r>
+            <a:r>
+              <a:rPr lang="ru-RU" sz="2000" dirty="0">
+                <a:cs typeface="Calibri"/>
+              </a:rPr>
+              <a:t>очереди доходит до указанного места, текущее значение </a:t>
             </a:r>
             <a:r>
               <a:rPr lang="en-US" sz="2000" dirty="0">
@@ -16948,7 +16960,7 @@
           <a:p>
             <a:pPr algn="just"/>
             <a:r>
-              <a:rPr lang="ru-RU" sz="2400" dirty="0">
+              <a:rPr lang="ru-RU" sz="2400">
                 <a:cs typeface="Calibri"/>
               </a:rPr>
               <a:t>Повторяем</a:t>
@@ -16956,27 +16968,6 @@
             <a:endParaRPr lang="en-US" sz="2400" dirty="0">
               <a:cs typeface="Calibri"/>
             </a:endParaRPr>
-          </a:p>
-          <a:p>
-            <a:pPr algn="just"/>
-            <a:r>
-              <a:rPr lang="ru-RU" sz="2400" b="1" dirty="0">
-                <a:cs typeface="Calibri"/>
-              </a:rPr>
-              <a:t>Перед первым использованием </a:t>
-            </a:r>
-            <a:r>
-              <a:rPr lang="en-US" sz="2400" b="1" dirty="0">
-                <a:cs typeface="Calibri"/>
-              </a:rPr>
-              <a:t>fence’</a:t>
-            </a:r>
-            <a:r>
-              <a:rPr lang="ru-RU" sz="2400" b="1" dirty="0">
-                <a:cs typeface="Calibri"/>
-              </a:rPr>
-              <a:t>ы надо «прогреть» - отправить на выполнение и дождаться завершения вхолостую, без списка команд</a:t>
-            </a:r>
           </a:p>
         </p:txBody>
       </p:sp>

</xml_diff>